<commit_message>
front-end and back-end & dissertation
</commit_message>
<xml_diff>
--- a/Documentations/Supervisor Meeting PowerPoints/12._Supervisor_Meeting_5Feb21.pptx
+++ b/Documentations/Supervisor Meeting PowerPoints/12._Supervisor_Meeting_5Feb21.pptx
@@ -5552,7 +5552,7 @@
           <a:p>
             <a:fld id="{F3B73EDB-C001-4FA3-A8F8-70B0B97F7CFF}" type="datetimeFigureOut">
               <a:rPr lang="en-GB" smtClean="0"/>
-              <a:t>30/01/2021</a:t>
+              <a:t>05/02/2021</a:t>
             </a:fld>
             <a:endParaRPr lang="en-GB"/>
           </a:p>
@@ -6463,7 +6463,7 @@
           <a:p>
             <a:fld id="{1D8BD707-D9CF-40AE-B4C6-C98DA3205C09}" type="datetimeFigureOut">
               <a:rPr lang="en-US"/>
-              <a:t>1/30/2021</a:t>
+              <a:t>2/5/2021</a:t>
             </a:fld>
             <a:endParaRPr lang="en-US"/>
           </a:p>
@@ -6638,7 +6638,7 @@
           <a:p>
             <a:fld id="{1D8BD707-D9CF-40AE-B4C6-C98DA3205C09}" type="datetimeFigureOut">
               <a:rPr lang="en-US"/>
-              <a:t>1/30/2021</a:t>
+              <a:t>2/5/2021</a:t>
             </a:fld>
             <a:endParaRPr lang="en-US"/>
           </a:p>
@@ -6852,7 +6852,7 @@
           <a:p>
             <a:fld id="{1D8BD707-D9CF-40AE-B4C6-C98DA3205C09}" type="datetimeFigureOut">
               <a:rPr lang="en-US"/>
-              <a:t>1/30/2021</a:t>
+              <a:t>2/5/2021</a:t>
             </a:fld>
             <a:endParaRPr lang="en-US"/>
           </a:p>
@@ -7000,7 +7000,7 @@
           <a:p>
             <a:fld id="{1D8BD707-D9CF-40AE-B4C6-C98DA3205C09}" type="datetimeFigureOut">
               <a:rPr lang="en-US"/>
-              <a:t>1/30/2021</a:t>
+              <a:t>2/5/2021</a:t>
             </a:fld>
             <a:endParaRPr lang="en-US"/>
           </a:p>
@@ -7119,7 +7119,7 @@
           <a:p>
             <a:fld id="{1D8BD707-D9CF-40AE-B4C6-C98DA3205C09}" type="datetimeFigureOut">
               <a:rPr lang="en-US"/>
-              <a:t>1/30/2021</a:t>
+              <a:t>2/5/2021</a:t>
             </a:fld>
             <a:endParaRPr lang="en-US"/>
           </a:p>
@@ -7342,7 +7342,7 @@
           <a:p>
             <a:fld id="{1D8BD707-D9CF-40AE-B4C6-C98DA3205C09}" type="datetimeFigureOut">
               <a:rPr lang="en-US"/>
-              <a:t>1/30/2021</a:t>
+              <a:t>2/5/2021</a:t>
             </a:fld>
             <a:endParaRPr lang="en-US"/>
           </a:p>
@@ -10845,7 +10845,7 @@
         <p:spPr>
           <a:xfrm>
             <a:off x="8467640" y="2892485"/>
-            <a:ext cx="9163713" cy="2261517"/>
+            <a:ext cx="9163713" cy="4544193"/>
           </a:xfrm>
           <a:prstGeom prst="rect">
             <a:avLst/>
@@ -10868,22 +10868,7 @@
                 <a:ea typeface="Roboto" panose="02000000000000000000" pitchFamily="2" charset="0"/>
                 <a:cs typeface="Roboto" panose="02000000000000000000" pitchFamily="2" charset="0"/>
               </a:rPr>
-              <a:t>Workflow</a:t>
-            </a:r>
-          </a:p>
-          <a:p>
-            <a:pPr marL="12700" marR="5080">
-              <a:spcBef>
-                <a:spcPts val="235"/>
-              </a:spcBef>
-            </a:pPr>
-            <a:r>
-              <a:rPr lang="en-US" sz="2800" kern="0" dirty="0">
-                <a:latin typeface="Raleway" panose="020B0503030101060003" pitchFamily="34" charset="0"/>
-                <a:ea typeface="Roboto" panose="02000000000000000000" pitchFamily="2" charset="0"/>
-                <a:cs typeface="Roboto" panose="02000000000000000000" pitchFamily="2" charset="0"/>
-              </a:rPr>
-              <a:t>-    Go through the design principles in XD. Ask Stephen whether to include design principles in the dissertation </a:t>
+              <a:t>Overall Coding Strategies </a:t>
             </a:r>
           </a:p>
           <a:p>
@@ -10900,7 +10885,7 @@
                 <a:ea typeface="Roboto" panose="02000000000000000000" pitchFamily="2" charset="0"/>
                 <a:cs typeface="Roboto" panose="02000000000000000000" pitchFamily="2" charset="0"/>
               </a:rPr>
-              <a:t>Project Development Strategy</a:t>
+              <a:t>Put the programming methodologies we have discussed in previous meetings into words</a:t>
             </a:r>
           </a:p>
           <a:p>
@@ -10911,14 +10896,95 @@
               <a:buFontTx/>
               <a:buChar char="-"/>
             </a:pPr>
+            <a:endParaRPr lang="en-US" sz="2800" kern="0" dirty="0">
+              <a:latin typeface="Raleway" panose="020B0503030101060003" pitchFamily="34" charset="0"/>
+              <a:ea typeface="Roboto" panose="02000000000000000000" pitchFamily="2" charset="0"/>
+              <a:cs typeface="Roboto" panose="02000000000000000000" pitchFamily="2" charset="0"/>
+            </a:endParaRPr>
+          </a:p>
+          <a:p>
+            <a:pPr marL="12700" marR="5080">
+              <a:spcBef>
+                <a:spcPts val="235"/>
+              </a:spcBef>
+            </a:pPr>
             <a:r>
               <a:rPr lang="en-US" sz="2800" kern="0" dirty="0">
                 <a:latin typeface="Raleway" panose="020B0503030101060003" pitchFamily="34" charset="0"/>
                 <a:ea typeface="Roboto" panose="02000000000000000000" pitchFamily="2" charset="0"/>
                 <a:cs typeface="Roboto" panose="02000000000000000000" pitchFamily="2" charset="0"/>
               </a:rPr>
-              <a:t>Design Principles  </a:t>
+              <a:t>Front-End Design and Coding</a:t>
             </a:r>
+          </a:p>
+          <a:p>
+            <a:pPr marL="12700" marR="5080">
+              <a:spcBef>
+                <a:spcPts val="235"/>
+              </a:spcBef>
+            </a:pPr>
+            <a:endParaRPr lang="en-US" sz="2800" kern="0" dirty="0">
+              <a:latin typeface="Raleway" panose="020B0503030101060003" pitchFamily="34" charset="0"/>
+              <a:ea typeface="Roboto" panose="02000000000000000000" pitchFamily="2" charset="0"/>
+              <a:cs typeface="Roboto" panose="02000000000000000000" pitchFamily="2" charset="0"/>
+            </a:endParaRPr>
+          </a:p>
+          <a:p>
+            <a:pPr marL="12700" marR="5080">
+              <a:spcBef>
+                <a:spcPts val="235"/>
+              </a:spcBef>
+            </a:pPr>
+            <a:r>
+              <a:rPr lang="en-US" sz="2800" kern="0" dirty="0">
+                <a:latin typeface="Raleway" panose="020B0503030101060003" pitchFamily="34" charset="0"/>
+                <a:ea typeface="Roboto" panose="02000000000000000000" pitchFamily="2" charset="0"/>
+                <a:cs typeface="Roboto" panose="02000000000000000000" pitchFamily="2" charset="0"/>
+              </a:rPr>
+              <a:t>Design</a:t>
+            </a:r>
+          </a:p>
+          <a:p>
+            <a:pPr marL="12700" marR="5080">
+              <a:spcBef>
+                <a:spcPts val="235"/>
+              </a:spcBef>
+            </a:pPr>
+            <a:r>
+              <a:rPr lang="en-US" sz="2800" kern="0" dirty="0">
+                <a:latin typeface="Raleway" panose="020B0503030101060003" pitchFamily="34" charset="0"/>
+                <a:ea typeface="Roboto" panose="02000000000000000000" pitchFamily="2" charset="0"/>
+                <a:cs typeface="Roboto" panose="02000000000000000000" pitchFamily="2" charset="0"/>
+              </a:rPr>
+              <a:t>Implementation</a:t>
+            </a:r>
+          </a:p>
+          <a:p>
+            <a:pPr marL="12700" marR="5080">
+              <a:spcBef>
+                <a:spcPts val="235"/>
+              </a:spcBef>
+            </a:pPr>
+            <a:r>
+              <a:rPr lang="en-US" sz="2800" kern="0" dirty="0">
+                <a:latin typeface="Raleway" panose="020B0503030101060003" pitchFamily="34" charset="0"/>
+                <a:ea typeface="Roboto" panose="02000000000000000000" pitchFamily="2" charset="0"/>
+                <a:cs typeface="Roboto" panose="02000000000000000000" pitchFamily="2" charset="0"/>
+              </a:rPr>
+              <a:t>Testing  </a:t>
+            </a:r>
+          </a:p>
+          <a:p>
+            <a:pPr marL="12700" marR="5080">
+              <a:spcBef>
+                <a:spcPts val="235"/>
+              </a:spcBef>
+            </a:pPr>
+            <a:endParaRPr lang="en-US" sz="2800" kern="0" dirty="0">
+              <a:latin typeface="Raleway" panose="020B0503030101060003" pitchFamily="34" charset="0"/>
+              <a:ea typeface="Roboto" panose="02000000000000000000" pitchFamily="2" charset="0"/>
+              <a:cs typeface="Roboto" panose="02000000000000000000" pitchFamily="2" charset="0"/>
+            </a:endParaRPr>
           </a:p>
         </p:txBody>
       </p:sp>

</xml_diff>